<commit_message>
improved player fsm images
</commit_message>
<xml_diff>
--- a/02_player/01_player.pptx
+++ b/02_player/01_player.pptx
@@ -2320,7 +2320,7 @@
           <a:p>
             <a:fld id="{FDE823E9-DC1C-471A-9AFE-6C25601F9C13}" type="datetimeFigureOut">
               <a:rPr lang="it-IT" smtClean="0"/>
-              <a:t>10/03/2025</a:t>
+              <a:t>11/03/2025</a:t>
             </a:fld>
             <a:endParaRPr lang="it-IT"/>
           </a:p>
@@ -2608,7 +2608,7 @@
           <a:p>
             <a:fld id="{FDE823E9-DC1C-471A-9AFE-6C25601F9C13}" type="datetimeFigureOut">
               <a:rPr lang="it-IT" smtClean="0"/>
-              <a:t>10/03/2025</a:t>
+              <a:t>11/03/2025</a:t>
             </a:fld>
             <a:endParaRPr lang="it-IT"/>
           </a:p>
@@ -2806,7 +2806,7 @@
           <a:p>
             <a:fld id="{FDE823E9-DC1C-471A-9AFE-6C25601F9C13}" type="datetimeFigureOut">
               <a:rPr lang="it-IT" smtClean="0"/>
-              <a:t>10/03/2025</a:t>
+              <a:t>11/03/2025</a:t>
             </a:fld>
             <a:endParaRPr lang="it-IT"/>
           </a:p>
@@ -3014,7 +3014,7 @@
           <a:p>
             <a:fld id="{FDE823E9-DC1C-471A-9AFE-6C25601F9C13}" type="datetimeFigureOut">
               <a:rPr lang="it-IT" smtClean="0"/>
-              <a:t>10/03/2025</a:t>
+              <a:t>11/03/2025</a:t>
             </a:fld>
             <a:endParaRPr lang="it-IT"/>
           </a:p>
@@ -4305,7 +4305,7 @@
           <a:p>
             <a:fld id="{FDE823E9-DC1C-471A-9AFE-6C25601F9C13}" type="datetimeFigureOut">
               <a:rPr lang="it-IT" smtClean="0"/>
-              <a:t>10/03/2025</a:t>
+              <a:t>11/03/2025</a:t>
             </a:fld>
             <a:endParaRPr lang="it-IT"/>
           </a:p>
@@ -4570,7 +4570,7 @@
           <a:p>
             <a:fld id="{FDE823E9-DC1C-471A-9AFE-6C25601F9C13}" type="datetimeFigureOut">
               <a:rPr lang="it-IT" smtClean="0"/>
-              <a:t>10/03/2025</a:t>
+              <a:t>11/03/2025</a:t>
             </a:fld>
             <a:endParaRPr lang="it-IT"/>
           </a:p>
@@ -4982,7 +4982,7 @@
           <a:p>
             <a:fld id="{FDE823E9-DC1C-471A-9AFE-6C25601F9C13}" type="datetimeFigureOut">
               <a:rPr lang="it-IT" smtClean="0"/>
-              <a:t>10/03/2025</a:t>
+              <a:t>11/03/2025</a:t>
             </a:fld>
             <a:endParaRPr lang="it-IT"/>
           </a:p>
@@ -5123,7 +5123,7 @@
           <a:p>
             <a:fld id="{FDE823E9-DC1C-471A-9AFE-6C25601F9C13}" type="datetimeFigureOut">
               <a:rPr lang="it-IT" smtClean="0"/>
-              <a:t>10/03/2025</a:t>
+              <a:t>11/03/2025</a:t>
             </a:fld>
             <a:endParaRPr lang="it-IT"/>
           </a:p>
@@ -6130,7 +6130,7 @@
           <a:p>
             <a:fld id="{FDE823E9-DC1C-471A-9AFE-6C25601F9C13}" type="datetimeFigureOut">
               <a:rPr lang="it-IT" smtClean="0"/>
-              <a:t>10/03/2025</a:t>
+              <a:t>11/03/2025</a:t>
             </a:fld>
             <a:endParaRPr lang="it-IT"/>
           </a:p>
@@ -9175,10 +9175,10 @@
       </p:sp>
       <p:pic>
         <p:nvPicPr>
-          <p:cNvPr id="3" name="Immagine 2" descr="Immagine che contiene cerchio, diagramma, schizzo, testo&#10;&#10;Il contenuto generato dall'IA potrebbe non essere corretto.">
-            <a:extLst>
-              <a:ext uri="{FF2B5EF4-FFF2-40B4-BE49-F238E27FC236}">
-                <a16:creationId xmlns:a16="http://schemas.microsoft.com/office/drawing/2014/main" id="{F339F1C2-40E6-BF33-74DC-C2A9F8703FC1}"/>
+          <p:cNvPr id="6" name="Immagine 5" descr="Immagine che contiene diagramma, schizzo, linea, testo&#10;&#10;Il contenuto generato dall'IA potrebbe non essere corretto.">
+            <a:extLst>
+              <a:ext uri="{FF2B5EF4-FFF2-40B4-BE49-F238E27FC236}">
+                <a16:creationId xmlns:a16="http://schemas.microsoft.com/office/drawing/2014/main" id="{6CBD9459-7B84-F2E4-E622-504DECB827C1}"/>
               </a:ext>
             </a:extLst>
           </p:cNvPr>
@@ -9201,12 +9201,12 @@
         </p:blipFill>
         <p:spPr>
           <a:xfrm>
-            <a:off x="1744005" y="923405"/>
-            <a:ext cx="8703990" cy="5455195"/>
+            <a:off x="1099175" y="1111540"/>
+            <a:ext cx="9993650" cy="4634920"/>
           </a:xfrm>
           <a:prstGeom prst="roundRect">
             <a:avLst>
-              <a:gd name="adj" fmla="val 4302"/>
+              <a:gd name="adj" fmla="val 5994"/>
             </a:avLst>
           </a:prstGeom>
         </p:spPr>
@@ -9763,10 +9763,10 @@
       </p:sp>
       <p:pic>
         <p:nvPicPr>
-          <p:cNvPr id="4" name="Immagine 3" descr="Immagine che contiene schizzo, disegno, diagramma, Line art&#10;&#10;Il contenuto generato dall'IA potrebbe non essere corretto.">
-            <a:extLst>
-              <a:ext uri="{FF2B5EF4-FFF2-40B4-BE49-F238E27FC236}">
-                <a16:creationId xmlns:a16="http://schemas.microsoft.com/office/drawing/2014/main" id="{8FA6F2E3-81F7-C490-F25C-C6B51AEBCD28}"/>
+          <p:cNvPr id="2" name="Immagine 1">
+            <a:extLst>
+              <a:ext uri="{FF2B5EF4-FFF2-40B4-BE49-F238E27FC236}">
+                <a16:creationId xmlns:a16="http://schemas.microsoft.com/office/drawing/2014/main" id="{1BB61A26-65A4-C89C-985C-B58CD0B886C1}"/>
               </a:ext>
             </a:extLst>
           </p:cNvPr>
@@ -9783,18 +9783,17 @@
               </a:ext>
             </a:extLst>
           </a:blip>
-          <a:stretch>
-            <a:fillRect/>
-          </a:stretch>
+          <a:srcRect/>
+          <a:stretch/>
         </p:blipFill>
         <p:spPr>
           <a:xfrm>
-            <a:off x="2998715" y="792289"/>
-            <a:ext cx="6194570" cy="5273421"/>
+            <a:off x="1099175" y="1111540"/>
+            <a:ext cx="9993650" cy="4634920"/>
           </a:xfrm>
           <a:prstGeom prst="roundRect">
             <a:avLst>
-              <a:gd name="adj" fmla="val 4642"/>
+              <a:gd name="adj" fmla="val 5994"/>
             </a:avLst>
           </a:prstGeom>
         </p:spPr>
@@ -9912,10 +9911,10 @@
       </p:sp>
       <p:pic>
         <p:nvPicPr>
-          <p:cNvPr id="2" name="Immagine 1" descr="Immagine che contiene schizzo, disegno, diagramma, Line art&#10;&#10;Il contenuto generato dall'IA potrebbe non essere corretto.">
-            <a:extLst>
-              <a:ext uri="{FF2B5EF4-FFF2-40B4-BE49-F238E27FC236}">
-                <a16:creationId xmlns:a16="http://schemas.microsoft.com/office/drawing/2014/main" id="{2BCF0931-F9D4-7BB6-0A14-F914ECF73B05}"/>
+          <p:cNvPr id="3" name="Immagine 2">
+            <a:extLst>
+              <a:ext uri="{FF2B5EF4-FFF2-40B4-BE49-F238E27FC236}">
+                <a16:creationId xmlns:a16="http://schemas.microsoft.com/office/drawing/2014/main" id="{F3635903-114B-AA01-6B0D-88B0BF142B21}"/>
               </a:ext>
             </a:extLst>
           </p:cNvPr>
@@ -9932,18 +9931,17 @@
               </a:ext>
             </a:extLst>
           </a:blip>
-          <a:stretch>
-            <a:fillRect/>
-          </a:stretch>
+          <a:srcRect/>
+          <a:stretch/>
         </p:blipFill>
         <p:spPr>
           <a:xfrm>
-            <a:off x="3498329" y="429912"/>
-            <a:ext cx="5195342" cy="5998175"/>
+            <a:off x="1099175" y="1111540"/>
+            <a:ext cx="9993650" cy="4634920"/>
           </a:xfrm>
           <a:prstGeom prst="roundRect">
             <a:avLst>
-              <a:gd name="adj" fmla="val 6226"/>
+              <a:gd name="adj" fmla="val 5994"/>
             </a:avLst>
           </a:prstGeom>
         </p:spPr>

</xml_diff>